<commit_message>
add code complete module
</commit_message>
<xml_diff>
--- a/report/LLM辅助的程序缺陷检测与修复.pptx
+++ b/report/LLM辅助的程序缺陷检测与修复.pptx
@@ -6,7 +6,7 @@
     <p:sldMasterId id="2147483650" r:id="rId2"/>
   </p:sldMasterIdLst>
   <p:notesMasterIdLst>
-    <p:notesMasterId r:id="rId40"/>
+    <p:notesMasterId r:id="rId41"/>
   </p:notesMasterIdLst>
   <p:sldIdLst>
     <p:sldId id="256" r:id="rId3"/>
@@ -30,22 +30,23 @@
     <p:sldId id="290" r:id="rId21"/>
     <p:sldId id="286" r:id="rId22"/>
     <p:sldId id="291" r:id="rId23"/>
-    <p:sldId id="267" r:id="rId24"/>
-    <p:sldId id="298" r:id="rId25"/>
-    <p:sldId id="264" r:id="rId26"/>
-    <p:sldId id="292" r:id="rId27"/>
-    <p:sldId id="265" r:id="rId28"/>
-    <p:sldId id="293" r:id="rId29"/>
-    <p:sldId id="294" r:id="rId30"/>
-    <p:sldId id="295" r:id="rId31"/>
-    <p:sldId id="296" r:id="rId32"/>
-    <p:sldId id="274" r:id="rId33"/>
-    <p:sldId id="278" r:id="rId34"/>
-    <p:sldId id="270" r:id="rId35"/>
-    <p:sldId id="271" r:id="rId36"/>
-    <p:sldId id="279" r:id="rId37"/>
-    <p:sldId id="280" r:id="rId38"/>
-    <p:sldId id="273" r:id="rId39"/>
+    <p:sldId id="299" r:id="rId24"/>
+    <p:sldId id="267" r:id="rId25"/>
+    <p:sldId id="298" r:id="rId26"/>
+    <p:sldId id="264" r:id="rId27"/>
+    <p:sldId id="292" r:id="rId28"/>
+    <p:sldId id="265" r:id="rId29"/>
+    <p:sldId id="293" r:id="rId30"/>
+    <p:sldId id="294" r:id="rId31"/>
+    <p:sldId id="295" r:id="rId32"/>
+    <p:sldId id="296" r:id="rId33"/>
+    <p:sldId id="274" r:id="rId34"/>
+    <p:sldId id="278" r:id="rId35"/>
+    <p:sldId id="270" r:id="rId36"/>
+    <p:sldId id="271" r:id="rId37"/>
+    <p:sldId id="279" r:id="rId38"/>
+    <p:sldId id="280" r:id="rId39"/>
+    <p:sldId id="273" r:id="rId40"/>
   </p:sldIdLst>
   <p:sldSz cx="9144000" cy="5143500" type="screen16x9"/>
   <p:notesSz cx="5143500" cy="9144000"/>
@@ -1887,7 +1888,13 @@
   <p:cSld>
     <p:spTree>
       <p:nvGrpSpPr>
-        <p:cNvPr id="1" name=""/>
+        <p:cNvPr id="1" name="">
+          <a:extLst>
+            <a:ext uri="{FF2B5EF4-FFF2-40B4-BE49-F238E27FC236}">
+              <a16:creationId xmlns:a16="http://schemas.microsoft.com/office/drawing/2014/main" id="{1ADFE3BD-A6D2-232F-7F1A-5C3D48D713CC}"/>
+            </a:ext>
+          </a:extLst>
+        </p:cNvPr>
         <p:cNvGrpSpPr/>
         <p:nvPr/>
       </p:nvGrpSpPr>
@@ -1901,7 +1908,13 @@
       </p:grpSpPr>
       <p:sp>
         <p:nvSpPr>
-          <p:cNvPr id="2" name="Slide Image Placeholder 1"/>
+          <p:cNvPr id="2" name="Slide Image Placeholder 1">
+            <a:extLst>
+              <a:ext uri="{FF2B5EF4-FFF2-40B4-BE49-F238E27FC236}">
+                <a16:creationId xmlns:a16="http://schemas.microsoft.com/office/drawing/2014/main" id="{A11587D8-86B0-22EA-4BAD-B3B44D5906DE}"/>
+              </a:ext>
+            </a:extLst>
+          </p:cNvPr>
           <p:cNvSpPr>
             <a:spLocks noGrp="1" noRot="1" noChangeAspect="1"/>
           </p:cNvSpPr>
@@ -1913,7 +1926,13 @@
       </p:sp>
       <p:sp>
         <p:nvSpPr>
-          <p:cNvPr id="3" name="Notes Placeholder 2"/>
+          <p:cNvPr id="3" name="Notes Placeholder 2">
+            <a:extLst>
+              <a:ext uri="{FF2B5EF4-FFF2-40B4-BE49-F238E27FC236}">
+                <a16:creationId xmlns:a16="http://schemas.microsoft.com/office/drawing/2014/main" id="{49FFB85B-EF5D-D2D6-7DC3-BBEEA2288CDE}"/>
+              </a:ext>
+            </a:extLst>
+          </p:cNvPr>
           <p:cNvSpPr>
             <a:spLocks noGrp="1"/>
           </p:cNvSpPr>
@@ -1932,7 +1951,13 @@
       </p:sp>
       <p:sp>
         <p:nvSpPr>
-          <p:cNvPr id="4" name="Slide Number Placeholder 3"/>
+          <p:cNvPr id="4" name="Slide Number Placeholder 3">
+            <a:extLst>
+              <a:ext uri="{FF2B5EF4-FFF2-40B4-BE49-F238E27FC236}">
+                <a16:creationId xmlns:a16="http://schemas.microsoft.com/office/drawing/2014/main" id="{FA908BF0-7288-5496-2E12-2F62F77FA819}"/>
+              </a:ext>
+            </a:extLst>
+          </p:cNvPr>
           <p:cNvSpPr>
             <a:spLocks noGrp="1"/>
           </p:cNvSpPr>
@@ -1945,18 +1970,78 @@
           <a:bodyPr/>
           <a:lstStyle/>
           <a:p>
+            <a:pPr marL="0" marR="0" lvl="0" indent="0" algn="r" defTabSz="914400" rtl="0" eaLnBrk="1" fontAlgn="auto" latinLnBrk="0" hangingPunct="1">
+              <a:lnSpc>
+                <a:spcPct val="100000"/>
+              </a:lnSpc>
+              <a:spcBef>
+                <a:spcPts val="0"/>
+              </a:spcBef>
+              <a:spcAft>
+                <a:spcPts val="0"/>
+              </a:spcAft>
+              <a:buClrTx/>
+              <a:buSzTx/>
+              <a:buFontTx/>
+              <a:buNone/>
+              <a:tabLst/>
+              <a:defRPr/>
+            </a:pPr>
             <a:fld id="{F7021451-1387-4CA6-816F-3879F97B5CBC}" type="slidenum">
-              <a:rPr lang="en-US"/>
+              <a:rPr kumimoji="0" lang="en-US" sz="1200" b="0" i="0" u="none" strike="noStrike" kern="1200" cap="none" spc="0" normalizeH="0" baseline="0" noProof="0">
+                <a:ln>
+                  <a:noFill/>
+                </a:ln>
+                <a:solidFill>
+                  <a:prstClr val="black"/>
+                </a:solidFill>
+                <a:effectLst/>
+                <a:uLnTx/>
+                <a:uFillTx/>
+                <a:latin typeface="等线" panose="020F0502020204030204"/>
+                <a:ea typeface="+mn-ea"/>
+                <a:cs typeface="+mn-cs"/>
+              </a:rPr>
+              <a:pPr marL="0" marR="0" lvl="0" indent="0" algn="r" defTabSz="914400" rtl="0" eaLnBrk="1" fontAlgn="auto" latinLnBrk="0" hangingPunct="1">
+                <a:lnSpc>
+                  <a:spcPct val="100000"/>
+                </a:lnSpc>
+                <a:spcBef>
+                  <a:spcPts val="0"/>
+                </a:spcBef>
+                <a:spcAft>
+                  <a:spcPts val="0"/>
+                </a:spcAft>
+                <a:buClrTx/>
+                <a:buSzTx/>
+                <a:buFontTx/>
+                <a:buNone/>
+                <a:tabLst/>
+                <a:defRPr/>
+              </a:pPr>
               <a:t>22</a:t>
             </a:fld>
-            <a:endParaRPr lang="en-US"/>
+            <a:endParaRPr kumimoji="0" lang="en-US" sz="1200" b="0" i="0" u="none" strike="noStrike" kern="1200" cap="none" spc="0" normalizeH="0" baseline="0" noProof="0">
+              <a:ln>
+                <a:noFill/>
+              </a:ln>
+              <a:solidFill>
+                <a:prstClr val="black"/>
+              </a:solidFill>
+              <a:effectLst/>
+              <a:uLnTx/>
+              <a:uFillTx/>
+              <a:latin typeface="等线" panose="020F0502020204030204"/>
+              <a:ea typeface="+mn-ea"/>
+              <a:cs typeface="+mn-cs"/>
+            </a:endParaRPr>
           </a:p>
         </p:txBody>
       </p:sp>
     </p:spTree>
     <p:extLst>
       <p:ext uri="{BB962C8B-B14F-4D97-AF65-F5344CB8AC3E}">
-        <p14:creationId xmlns:p14="http://schemas.microsoft.com/office/powerpoint/2010/main" val="1024086991"/>
+        <p14:creationId xmlns:p14="http://schemas.microsoft.com/office/powerpoint/2010/main" val="1592085510"/>
       </p:ext>
     </p:extLst>
   </p:cSld>
@@ -2055,6 +2140,90 @@
   <p:cSld>
     <p:spTree>
       <p:nvGrpSpPr>
+        <p:cNvPr id="1" name=""/>
+        <p:cNvGrpSpPr/>
+        <p:nvPr/>
+      </p:nvGrpSpPr>
+      <p:grpSpPr>
+        <a:xfrm>
+          <a:off x="0" y="0"/>
+          <a:ext cx="0" cy="0"/>
+          <a:chOff x="0" y="0"/>
+          <a:chExt cx="0" cy="0"/>
+        </a:xfrm>
+      </p:grpSpPr>
+      <p:sp>
+        <p:nvSpPr>
+          <p:cNvPr id="2" name="Slide Image Placeholder 1"/>
+          <p:cNvSpPr>
+            <a:spLocks noGrp="1" noRot="1" noChangeAspect="1"/>
+          </p:cNvSpPr>
+          <p:nvPr>
+            <p:ph type="sldImg"/>
+          </p:nvPr>
+        </p:nvSpPr>
+        <p:spPr/>
+      </p:sp>
+      <p:sp>
+        <p:nvSpPr>
+          <p:cNvPr id="3" name="Notes Placeholder 2"/>
+          <p:cNvSpPr>
+            <a:spLocks noGrp="1"/>
+          </p:cNvSpPr>
+          <p:nvPr>
+            <p:ph type="body" idx="1"/>
+          </p:nvPr>
+        </p:nvSpPr>
+        <p:spPr/>
+        <p:txBody>
+          <a:bodyPr/>
+          <a:lstStyle/>
+          <a:p>
+            <a:endParaRPr lang="en-US" dirty="0"/>
+          </a:p>
+        </p:txBody>
+      </p:sp>
+      <p:sp>
+        <p:nvSpPr>
+          <p:cNvPr id="4" name="Slide Number Placeholder 3"/>
+          <p:cNvSpPr>
+            <a:spLocks noGrp="1"/>
+          </p:cNvSpPr>
+          <p:nvPr>
+            <p:ph type="sldNum" sz="quarter" idx="10"/>
+          </p:nvPr>
+        </p:nvSpPr>
+        <p:spPr/>
+        <p:txBody>
+          <a:bodyPr/>
+          <a:lstStyle/>
+          <a:p>
+            <a:fld id="{F7021451-1387-4CA6-816F-3879F97B5CBC}" type="slidenum">
+              <a:rPr lang="en-US"/>
+              <a:t>23</a:t>
+            </a:fld>
+            <a:endParaRPr lang="en-US"/>
+          </a:p>
+        </p:txBody>
+      </p:sp>
+    </p:spTree>
+    <p:extLst>
+      <p:ext uri="{BB962C8B-B14F-4D97-AF65-F5344CB8AC3E}">
+        <p14:creationId xmlns:p14="http://schemas.microsoft.com/office/powerpoint/2010/main" val="1024086991"/>
+      </p:ext>
+    </p:extLst>
+  </p:cSld>
+  <p:clrMapOvr>
+    <a:masterClrMapping/>
+  </p:clrMapOvr>
+</p:notes>
+</file>
+
+<file path=ppt/notesSlides/notesSlide21.xml><?xml version="1.0" encoding="utf-8"?>
+<p:notes xmlns:a="http://schemas.openxmlformats.org/drawingml/2006/main" xmlns:r="http://schemas.openxmlformats.org/officeDocument/2006/relationships" xmlns:p="http://schemas.openxmlformats.org/presentationml/2006/main">
+  <p:cSld>
+    <p:spTree>
+      <p:nvGrpSpPr>
         <p:cNvPr id="1" name="">
           <a:extLst>
             <a:ext uri="{FF2B5EF4-FFF2-40B4-BE49-F238E27FC236}">
@@ -2186,7 +2355,7 @@
                 <a:tabLst/>
                 <a:defRPr/>
               </a:pPr>
-              <a:t>23</a:t>
+              <a:t>24</a:t>
             </a:fld>
             <a:endParaRPr kumimoji="0" lang="en-US" sz="1200" b="0" i="0" u="none" strike="noStrike" kern="1200" cap="none" spc="0" normalizeH="0" baseline="0" noProof="0">
               <a:ln>
@@ -2209,90 +2378,6 @@
     <p:extLst>
       <p:ext uri="{BB962C8B-B14F-4D97-AF65-F5344CB8AC3E}">
         <p14:creationId xmlns:p14="http://schemas.microsoft.com/office/powerpoint/2010/main" val="2675901159"/>
-      </p:ext>
-    </p:extLst>
-  </p:cSld>
-  <p:clrMapOvr>
-    <a:masterClrMapping/>
-  </p:clrMapOvr>
-</p:notes>
-</file>
-
-<file path=ppt/notesSlides/notesSlide21.xml><?xml version="1.0" encoding="utf-8"?>
-<p:notes xmlns:a="http://schemas.openxmlformats.org/drawingml/2006/main" xmlns:r="http://schemas.openxmlformats.org/officeDocument/2006/relationships" xmlns:p="http://schemas.openxmlformats.org/presentationml/2006/main">
-  <p:cSld>
-    <p:spTree>
-      <p:nvGrpSpPr>
-        <p:cNvPr id="1" name=""/>
-        <p:cNvGrpSpPr/>
-        <p:nvPr/>
-      </p:nvGrpSpPr>
-      <p:grpSpPr>
-        <a:xfrm>
-          <a:off x="0" y="0"/>
-          <a:ext cx="0" cy="0"/>
-          <a:chOff x="0" y="0"/>
-          <a:chExt cx="0" cy="0"/>
-        </a:xfrm>
-      </p:grpSpPr>
-      <p:sp>
-        <p:nvSpPr>
-          <p:cNvPr id="2" name="Slide Image Placeholder 1"/>
-          <p:cNvSpPr>
-            <a:spLocks noGrp="1" noRot="1" noChangeAspect="1"/>
-          </p:cNvSpPr>
-          <p:nvPr>
-            <p:ph type="sldImg"/>
-          </p:nvPr>
-        </p:nvSpPr>
-        <p:spPr/>
-      </p:sp>
-      <p:sp>
-        <p:nvSpPr>
-          <p:cNvPr id="3" name="Notes Placeholder 2"/>
-          <p:cNvSpPr>
-            <a:spLocks noGrp="1"/>
-          </p:cNvSpPr>
-          <p:nvPr>
-            <p:ph type="body" idx="1"/>
-          </p:nvPr>
-        </p:nvSpPr>
-        <p:spPr/>
-        <p:txBody>
-          <a:bodyPr/>
-          <a:lstStyle/>
-          <a:p>
-            <a:endParaRPr lang="en-US" dirty="0"/>
-          </a:p>
-        </p:txBody>
-      </p:sp>
-      <p:sp>
-        <p:nvSpPr>
-          <p:cNvPr id="4" name="Slide Number Placeholder 3"/>
-          <p:cNvSpPr>
-            <a:spLocks noGrp="1"/>
-          </p:cNvSpPr>
-          <p:nvPr>
-            <p:ph type="sldNum" sz="quarter" idx="10"/>
-          </p:nvPr>
-        </p:nvSpPr>
-        <p:spPr/>
-        <p:txBody>
-          <a:bodyPr/>
-          <a:lstStyle/>
-          <a:p>
-            <a:fld id="{F7021451-1387-4CA6-816F-3879F97B5CBC}" type="slidenum">
-              <a:rPr lang="en-US"/>
-              <a:t>24</a:t>
-            </a:fld>
-            <a:endParaRPr lang="en-US"/>
-          </a:p>
-        </p:txBody>
-      </p:sp>
-    </p:spTree>
-    <p:extLst>
-      <p:ext uri="{BB962C8B-B14F-4D97-AF65-F5344CB8AC3E}">
-        <p14:creationId xmlns:p14="http://schemas.microsoft.com/office/powerpoint/2010/main" val="1024086991"/>
       </p:ext>
     </p:extLst>
   </p:cSld>
@@ -2367,7 +2452,7 @@
           <a:p>
             <a:fld id="{F7021451-1387-4CA6-816F-3879F97B5CBC}" type="slidenum">
               <a:rPr lang="en-US"/>
-              <a:t>26</a:t>
+              <a:t>25</a:t>
             </a:fld>
             <a:endParaRPr lang="en-US"/>
           </a:p>
@@ -2387,6 +2472,90 @@
 </file>
 
 <file path=ppt/notesSlides/notesSlide23.xml><?xml version="1.0" encoding="utf-8"?>
+<p:notes xmlns:a="http://schemas.openxmlformats.org/drawingml/2006/main" xmlns:r="http://schemas.openxmlformats.org/officeDocument/2006/relationships" xmlns:p="http://schemas.openxmlformats.org/presentationml/2006/main">
+  <p:cSld>
+    <p:spTree>
+      <p:nvGrpSpPr>
+        <p:cNvPr id="1" name=""/>
+        <p:cNvGrpSpPr/>
+        <p:nvPr/>
+      </p:nvGrpSpPr>
+      <p:grpSpPr>
+        <a:xfrm>
+          <a:off x="0" y="0"/>
+          <a:ext cx="0" cy="0"/>
+          <a:chOff x="0" y="0"/>
+          <a:chExt cx="0" cy="0"/>
+        </a:xfrm>
+      </p:grpSpPr>
+      <p:sp>
+        <p:nvSpPr>
+          <p:cNvPr id="2" name="Slide Image Placeholder 1"/>
+          <p:cNvSpPr>
+            <a:spLocks noGrp="1" noRot="1" noChangeAspect="1"/>
+          </p:cNvSpPr>
+          <p:nvPr>
+            <p:ph type="sldImg"/>
+          </p:nvPr>
+        </p:nvSpPr>
+        <p:spPr/>
+      </p:sp>
+      <p:sp>
+        <p:nvSpPr>
+          <p:cNvPr id="3" name="Notes Placeholder 2"/>
+          <p:cNvSpPr>
+            <a:spLocks noGrp="1"/>
+          </p:cNvSpPr>
+          <p:nvPr>
+            <p:ph type="body" idx="1"/>
+          </p:nvPr>
+        </p:nvSpPr>
+        <p:spPr/>
+        <p:txBody>
+          <a:bodyPr/>
+          <a:lstStyle/>
+          <a:p>
+            <a:endParaRPr lang="en-US" dirty="0"/>
+          </a:p>
+        </p:txBody>
+      </p:sp>
+      <p:sp>
+        <p:nvSpPr>
+          <p:cNvPr id="4" name="Slide Number Placeholder 3"/>
+          <p:cNvSpPr>
+            <a:spLocks noGrp="1"/>
+          </p:cNvSpPr>
+          <p:nvPr>
+            <p:ph type="sldNum" sz="quarter" idx="10"/>
+          </p:nvPr>
+        </p:nvSpPr>
+        <p:spPr/>
+        <p:txBody>
+          <a:bodyPr/>
+          <a:lstStyle/>
+          <a:p>
+            <a:fld id="{F7021451-1387-4CA6-816F-3879F97B5CBC}" type="slidenum">
+              <a:rPr lang="en-US"/>
+              <a:t>27</a:t>
+            </a:fld>
+            <a:endParaRPr lang="en-US"/>
+          </a:p>
+        </p:txBody>
+      </p:sp>
+    </p:spTree>
+    <p:extLst>
+      <p:ext uri="{BB962C8B-B14F-4D97-AF65-F5344CB8AC3E}">
+        <p14:creationId xmlns:p14="http://schemas.microsoft.com/office/powerpoint/2010/main" val="1024086991"/>
+      </p:ext>
+    </p:extLst>
+  </p:cSld>
+  <p:clrMapOvr>
+    <a:masterClrMapping/>
+  </p:clrMapOvr>
+</p:notes>
+</file>
+
+<file path=ppt/notesSlides/notesSlide24.xml><?xml version="1.0" encoding="utf-8"?>
 <p:notes xmlns:a="http://schemas.openxmlformats.org/drawingml/2006/main" xmlns:r="http://schemas.openxmlformats.org/officeDocument/2006/relationships" xmlns:p="http://schemas.openxmlformats.org/presentationml/2006/main">
   <p:cSld>
     <p:spTree>
@@ -2475,7 +2644,7 @@
           <a:p>
             <a:fld id="{F7021451-1387-4CA6-816F-3879F97B5CBC}" type="slidenum">
               <a:rPr lang="en-US"/>
-              <a:t>31</a:t>
+              <a:t>32</a:t>
             </a:fld>
             <a:endParaRPr lang="en-US"/>
           </a:p>
@@ -2485,90 +2654,6 @@
     <p:extLst>
       <p:ext uri="{BB962C8B-B14F-4D97-AF65-F5344CB8AC3E}">
         <p14:creationId xmlns:p14="http://schemas.microsoft.com/office/powerpoint/2010/main" val="2757278345"/>
-      </p:ext>
-    </p:extLst>
-  </p:cSld>
-  <p:clrMapOvr>
-    <a:masterClrMapping/>
-  </p:clrMapOvr>
-</p:notes>
-</file>
-
-<file path=ppt/notesSlides/notesSlide24.xml><?xml version="1.0" encoding="utf-8"?>
-<p:notes xmlns:a="http://schemas.openxmlformats.org/drawingml/2006/main" xmlns:r="http://schemas.openxmlformats.org/officeDocument/2006/relationships" xmlns:p="http://schemas.openxmlformats.org/presentationml/2006/main">
-  <p:cSld>
-    <p:spTree>
-      <p:nvGrpSpPr>
-        <p:cNvPr id="1" name=""/>
-        <p:cNvGrpSpPr/>
-        <p:nvPr/>
-      </p:nvGrpSpPr>
-      <p:grpSpPr>
-        <a:xfrm>
-          <a:off x="0" y="0"/>
-          <a:ext cx="0" cy="0"/>
-          <a:chOff x="0" y="0"/>
-          <a:chExt cx="0" cy="0"/>
-        </a:xfrm>
-      </p:grpSpPr>
-      <p:sp>
-        <p:nvSpPr>
-          <p:cNvPr id="2" name="Slide Image Placeholder 1"/>
-          <p:cNvSpPr>
-            <a:spLocks noGrp="1" noRot="1" noChangeAspect="1"/>
-          </p:cNvSpPr>
-          <p:nvPr>
-            <p:ph type="sldImg"/>
-          </p:nvPr>
-        </p:nvSpPr>
-        <p:spPr/>
-      </p:sp>
-      <p:sp>
-        <p:nvSpPr>
-          <p:cNvPr id="3" name="Notes Placeholder 2"/>
-          <p:cNvSpPr>
-            <a:spLocks noGrp="1"/>
-          </p:cNvSpPr>
-          <p:nvPr>
-            <p:ph type="body" idx="1"/>
-          </p:nvPr>
-        </p:nvSpPr>
-        <p:spPr/>
-        <p:txBody>
-          <a:bodyPr/>
-          <a:lstStyle/>
-          <a:p>
-            <a:endParaRPr lang="en-US" dirty="0"/>
-          </a:p>
-        </p:txBody>
-      </p:sp>
-      <p:sp>
-        <p:nvSpPr>
-          <p:cNvPr id="4" name="Slide Number Placeholder 3"/>
-          <p:cNvSpPr>
-            <a:spLocks noGrp="1"/>
-          </p:cNvSpPr>
-          <p:nvPr>
-            <p:ph type="sldNum" sz="quarter" idx="10"/>
-          </p:nvPr>
-        </p:nvSpPr>
-        <p:spPr/>
-        <p:txBody>
-          <a:bodyPr/>
-          <a:lstStyle/>
-          <a:p>
-            <a:fld id="{F7021451-1387-4CA6-816F-3879F97B5CBC}" type="slidenum">
-              <a:rPr lang="en-US"/>
-              <a:t>33</a:t>
-            </a:fld>
-            <a:endParaRPr lang="en-US"/>
-          </a:p>
-        </p:txBody>
-      </p:sp>
-    </p:spTree>
-    <p:extLst>
-      <p:ext uri="{BB962C8B-B14F-4D97-AF65-F5344CB8AC3E}">
-        <p14:creationId xmlns:p14="http://schemas.microsoft.com/office/powerpoint/2010/main" val="1024086991"/>
       </p:ext>
     </p:extLst>
   </p:cSld>
@@ -2727,7 +2812,91 @@
           <a:p>
             <a:fld id="{F7021451-1387-4CA6-816F-3879F97B5CBC}" type="slidenum">
               <a:rPr lang="en-US"/>
-              <a:t>37</a:t>
+              <a:t>35</a:t>
+            </a:fld>
+            <a:endParaRPr lang="en-US"/>
+          </a:p>
+        </p:txBody>
+      </p:sp>
+    </p:spTree>
+    <p:extLst>
+      <p:ext uri="{BB962C8B-B14F-4D97-AF65-F5344CB8AC3E}">
+        <p14:creationId xmlns:p14="http://schemas.microsoft.com/office/powerpoint/2010/main" val="1024086991"/>
+      </p:ext>
+    </p:extLst>
+  </p:cSld>
+  <p:clrMapOvr>
+    <a:masterClrMapping/>
+  </p:clrMapOvr>
+</p:notes>
+</file>
+
+<file path=ppt/notesSlides/notesSlide27.xml><?xml version="1.0" encoding="utf-8"?>
+<p:notes xmlns:a="http://schemas.openxmlformats.org/drawingml/2006/main" xmlns:r="http://schemas.openxmlformats.org/officeDocument/2006/relationships" xmlns:p="http://schemas.openxmlformats.org/presentationml/2006/main">
+  <p:cSld>
+    <p:spTree>
+      <p:nvGrpSpPr>
+        <p:cNvPr id="1" name=""/>
+        <p:cNvGrpSpPr/>
+        <p:nvPr/>
+      </p:nvGrpSpPr>
+      <p:grpSpPr>
+        <a:xfrm>
+          <a:off x="0" y="0"/>
+          <a:ext cx="0" cy="0"/>
+          <a:chOff x="0" y="0"/>
+          <a:chExt cx="0" cy="0"/>
+        </a:xfrm>
+      </p:grpSpPr>
+      <p:sp>
+        <p:nvSpPr>
+          <p:cNvPr id="2" name="Slide Image Placeholder 1"/>
+          <p:cNvSpPr>
+            <a:spLocks noGrp="1" noRot="1" noChangeAspect="1"/>
+          </p:cNvSpPr>
+          <p:nvPr>
+            <p:ph type="sldImg"/>
+          </p:nvPr>
+        </p:nvSpPr>
+        <p:spPr/>
+      </p:sp>
+      <p:sp>
+        <p:nvSpPr>
+          <p:cNvPr id="3" name="Notes Placeholder 2"/>
+          <p:cNvSpPr>
+            <a:spLocks noGrp="1"/>
+          </p:cNvSpPr>
+          <p:nvPr>
+            <p:ph type="body" idx="1"/>
+          </p:nvPr>
+        </p:nvSpPr>
+        <p:spPr/>
+        <p:txBody>
+          <a:bodyPr/>
+          <a:lstStyle/>
+          <a:p>
+            <a:endParaRPr lang="en-US" dirty="0"/>
+          </a:p>
+        </p:txBody>
+      </p:sp>
+      <p:sp>
+        <p:nvSpPr>
+          <p:cNvPr id="4" name="Slide Number Placeholder 3"/>
+          <p:cNvSpPr>
+            <a:spLocks noGrp="1"/>
+          </p:cNvSpPr>
+          <p:nvPr>
+            <p:ph type="sldNum" sz="quarter" idx="10"/>
+          </p:nvPr>
+        </p:nvSpPr>
+        <p:spPr/>
+        <p:txBody>
+          <a:bodyPr/>
+          <a:lstStyle/>
+          <a:p>
+            <a:fld id="{F7021451-1387-4CA6-816F-3879F97B5CBC}" type="slidenum">
+              <a:rPr lang="en-US"/>
+              <a:t>38</a:t>
             </a:fld>
             <a:endParaRPr lang="en-US"/>
           </a:p>
@@ -19407,6 +19576,223 @@
 
 <file path=ppt/slides/slide22.xml><?xml version="1.0" encoding="utf-8"?>
 <p:sld xmlns:a="http://schemas.openxmlformats.org/drawingml/2006/main" xmlns:r="http://schemas.openxmlformats.org/officeDocument/2006/relationships" xmlns:p="http://schemas.openxmlformats.org/presentationml/2006/main">
+  <p:cSld>
+    <p:spTree>
+      <p:nvGrpSpPr>
+        <p:cNvPr id="1" name="">
+          <a:extLst>
+            <a:ext uri="{FF2B5EF4-FFF2-40B4-BE49-F238E27FC236}">
+              <a16:creationId xmlns:a16="http://schemas.microsoft.com/office/drawing/2014/main" id="{528B1497-20F7-119F-020C-C4A71F7611EE}"/>
+            </a:ext>
+          </a:extLst>
+        </p:cNvPr>
+        <p:cNvGrpSpPr/>
+        <p:nvPr/>
+      </p:nvGrpSpPr>
+      <p:grpSpPr>
+        <a:xfrm>
+          <a:off x="0" y="0"/>
+          <a:ext cx="0" cy="0"/>
+          <a:chOff x="0" y="0"/>
+          <a:chExt cx="0" cy="0"/>
+        </a:xfrm>
+      </p:grpSpPr>
+      <p:pic>
+        <p:nvPicPr>
+          <p:cNvPr id="2" name="Image 0" descr="preencoded.png">
+            <a:extLst>
+              <a:ext uri="{FF2B5EF4-FFF2-40B4-BE49-F238E27FC236}">
+                <a16:creationId xmlns:a16="http://schemas.microsoft.com/office/drawing/2014/main" id="{7D82AB10-F778-7560-6E02-286096DA7232}"/>
+              </a:ext>
+            </a:extLst>
+          </p:cNvPr>
+          <p:cNvPicPr>
+            <a:picLocks noChangeAspect="1"/>
+          </p:cNvPicPr>
+          <p:nvPr/>
+        </p:nvPicPr>
+        <p:blipFill>
+          <a:blip r:embed="rId3"/>
+          <a:srcRect t="3571" b="3571"/>
+          <a:stretch/>
+        </p:blipFill>
+        <p:spPr>
+          <a:xfrm>
+            <a:off x="0" y="0"/>
+            <a:ext cx="9144000" cy="1238250"/>
+          </a:xfrm>
+          <a:prstGeom prst="rect">
+            <a:avLst/>
+          </a:prstGeom>
+        </p:spPr>
+      </p:pic>
+      <p:sp>
+        <p:nvSpPr>
+          <p:cNvPr id="3" name="Text 0">
+            <a:extLst>
+              <a:ext uri="{FF2B5EF4-FFF2-40B4-BE49-F238E27FC236}">
+                <a16:creationId xmlns:a16="http://schemas.microsoft.com/office/drawing/2014/main" id="{995CDB3D-C521-B0D0-90FA-E3E4B873EF64}"/>
+              </a:ext>
+            </a:extLst>
+          </p:cNvPr>
+          <p:cNvSpPr/>
+          <p:nvPr/>
+        </p:nvSpPr>
+        <p:spPr>
+          <a:xfrm>
+            <a:off x="571500" y="285750"/>
+            <a:ext cx="8001000" cy="400050"/>
+          </a:xfrm>
+          <a:prstGeom prst="rect">
+            <a:avLst/>
+          </a:prstGeom>
+          <a:noFill/>
+          <a:ln/>
+        </p:spPr>
+        <p:txBody>
+          <a:bodyPr vert="horz" wrap="square" lIns="0" tIns="0" rIns="0" bIns="0" rtlCol="0" anchor="ctr"/>
+          <a:lstStyle/>
+          <a:p>
+            <a:pPr defTabSz="685800">
+              <a:lnSpc>
+                <a:spcPts val="3150"/>
+              </a:lnSpc>
+            </a:pPr>
+            <a:r>
+              <a:rPr lang="zh-CN" altLang="en-US" sz="2250" b="1" dirty="0">
+                <a:solidFill>
+                  <a:srgbClr val="FFFFFF"/>
+                </a:solidFill>
+                <a:latin typeface="Microsoft YaHei" pitchFamily="34" charset="0"/>
+                <a:ea typeface="Microsoft YaHei" pitchFamily="34" charset="-122"/>
+                <a:cs typeface="Microsoft YaHei" pitchFamily="34" charset="-120"/>
+              </a:rPr>
+              <a:t>代码补全模块</a:t>
+            </a:r>
+          </a:p>
+        </p:txBody>
+      </p:sp>
+      <p:sp>
+        <p:nvSpPr>
+          <p:cNvPr id="4" name="Text 1">
+            <a:extLst>
+              <a:ext uri="{FF2B5EF4-FFF2-40B4-BE49-F238E27FC236}">
+                <a16:creationId xmlns:a16="http://schemas.microsoft.com/office/drawing/2014/main" id="{1652019E-674A-A44E-7013-C481C6A2655A}"/>
+              </a:ext>
+            </a:extLst>
+          </p:cNvPr>
+          <p:cNvSpPr/>
+          <p:nvPr/>
+        </p:nvSpPr>
+        <p:spPr>
+          <a:xfrm>
+            <a:off x="571500" y="742950"/>
+            <a:ext cx="8001000" cy="209550"/>
+          </a:xfrm>
+          <a:prstGeom prst="rect">
+            <a:avLst/>
+          </a:prstGeom>
+          <a:noFill/>
+          <a:ln/>
+        </p:spPr>
+        <p:txBody>
+          <a:bodyPr vert="horz" wrap="square" lIns="0" tIns="0" rIns="0" bIns="0" rtlCol="0" anchor="ctr"/>
+          <a:lstStyle/>
+          <a:p>
+            <a:pPr defTabSz="685800">
+              <a:lnSpc>
+                <a:spcPts val="1650"/>
+              </a:lnSpc>
+            </a:pPr>
+            <a:endParaRPr lang="en-US" sz="1200" dirty="0">
+              <a:solidFill>
+                <a:prstClr val="black"/>
+              </a:solidFill>
+              <a:latin typeface="等线" panose="020F0502020204030204"/>
+            </a:endParaRPr>
+          </a:p>
+        </p:txBody>
+      </p:sp>
+      <p:sp>
+        <p:nvSpPr>
+          <p:cNvPr id="11" name="文本框 10">
+            <a:extLst>
+              <a:ext uri="{FF2B5EF4-FFF2-40B4-BE49-F238E27FC236}">
+                <a16:creationId xmlns:a16="http://schemas.microsoft.com/office/drawing/2014/main" id="{88B00ED7-7C05-6282-10D3-B16838877FA2}"/>
+              </a:ext>
+            </a:extLst>
+          </p:cNvPr>
+          <p:cNvSpPr txBox="1"/>
+          <p:nvPr/>
+        </p:nvSpPr>
+        <p:spPr>
+          <a:xfrm>
+            <a:off x="510139" y="1424539"/>
+            <a:ext cx="5982101" cy="276999"/>
+          </a:xfrm>
+          <a:prstGeom prst="rect">
+            <a:avLst/>
+          </a:prstGeom>
+          <a:noFill/>
+        </p:spPr>
+        <p:txBody>
+          <a:bodyPr wrap="square" rtlCol="0">
+            <a:spAutoFit/>
+          </a:bodyPr>
+          <a:lstStyle/>
+          <a:p>
+            <a:r>
+              <a:rPr lang="zh-CN" altLang="en-US" sz="1200" dirty="0"/>
+              <a:t>与代码修复模块的实现一样，只需要修改给大模型的任务描述即可</a:t>
+            </a:r>
+          </a:p>
+        </p:txBody>
+      </p:sp>
+      <p:pic>
+        <p:nvPicPr>
+          <p:cNvPr id="13" name="图片 12">
+            <a:extLst>
+              <a:ext uri="{FF2B5EF4-FFF2-40B4-BE49-F238E27FC236}">
+                <a16:creationId xmlns:a16="http://schemas.microsoft.com/office/drawing/2014/main" id="{24EE4A58-E659-3BE2-1F41-1DBAD41E2034}"/>
+              </a:ext>
+            </a:extLst>
+          </p:cNvPr>
+          <p:cNvPicPr>
+            <a:picLocks noChangeAspect="1"/>
+          </p:cNvPicPr>
+          <p:nvPr/>
+        </p:nvPicPr>
+        <p:blipFill>
+          <a:blip r:embed="rId4"/>
+          <a:stretch>
+            <a:fillRect/>
+          </a:stretch>
+        </p:blipFill>
+        <p:spPr>
+          <a:xfrm>
+            <a:off x="571500" y="2078919"/>
+            <a:ext cx="7483642" cy="353284"/>
+          </a:xfrm>
+          <a:prstGeom prst="rect">
+            <a:avLst/>
+          </a:prstGeom>
+        </p:spPr>
+      </p:pic>
+    </p:spTree>
+    <p:extLst>
+      <p:ext uri="{BB962C8B-B14F-4D97-AF65-F5344CB8AC3E}">
+        <p14:creationId xmlns:p14="http://schemas.microsoft.com/office/powerpoint/2010/main" val="620502084"/>
+      </p:ext>
+    </p:extLst>
+  </p:cSld>
+  <p:clrMapOvr>
+    <a:masterClrMapping/>
+  </p:clrMapOvr>
+</p:sld>
+</file>
+
+<file path=ppt/slides/slide23.xml><?xml version="1.0" encoding="utf-8"?>
+<p:sld xmlns:a="http://schemas.openxmlformats.org/drawingml/2006/main" xmlns:r="http://schemas.openxmlformats.org/officeDocument/2006/relationships" xmlns:p="http://schemas.openxmlformats.org/presentationml/2006/main">
   <p:cSld name="Slide 12">
     <p:spTree>
       <p:nvGrpSpPr>
@@ -19590,7 +19976,7 @@
 </p:sld>
 </file>
 
-<file path=ppt/slides/slide23.xml><?xml version="1.0" encoding="utf-8"?>
+<file path=ppt/slides/slide24.xml><?xml version="1.0" encoding="utf-8"?>
 <p:sld xmlns:a="http://schemas.openxmlformats.org/drawingml/2006/main" xmlns:r="http://schemas.openxmlformats.org/officeDocument/2006/relationships" xmlns:p="http://schemas.openxmlformats.org/presentationml/2006/main">
   <p:cSld>
     <p:spTree>
@@ -20169,7 +20555,7 @@
 </p:sld>
 </file>
 
-<file path=ppt/slides/slide24.xml><?xml version="1.0" encoding="utf-8"?>
+<file path=ppt/slides/slide25.xml><?xml version="1.0" encoding="utf-8"?>
 <p:sld xmlns:a="http://schemas.openxmlformats.org/drawingml/2006/main" xmlns:r="http://schemas.openxmlformats.org/officeDocument/2006/relationships" xmlns:p="http://schemas.openxmlformats.org/presentationml/2006/main">
   <p:cSld name="Slide 9">
     <p:spTree>
@@ -20365,7 +20751,7 @@
 </p:sld>
 </file>
 
-<file path=ppt/slides/slide25.xml><?xml version="1.0" encoding="utf-8"?>
+<file path=ppt/slides/slide26.xml><?xml version="1.0" encoding="utf-8"?>
 <p:sld xmlns:a="http://schemas.openxmlformats.org/drawingml/2006/main" xmlns:r="http://schemas.openxmlformats.org/officeDocument/2006/relationships" xmlns:p="http://schemas.openxmlformats.org/presentationml/2006/main">
   <p:cSld>
     <p:spTree>
@@ -20517,7 +20903,7 @@
 </p:sld>
 </file>
 
-<file path=ppt/slides/slide26.xml><?xml version="1.0" encoding="utf-8"?>
+<file path=ppt/slides/slide27.xml><?xml version="1.0" encoding="utf-8"?>
 <p:sld xmlns:a="http://schemas.openxmlformats.org/drawingml/2006/main" xmlns:r="http://schemas.openxmlformats.org/officeDocument/2006/relationships" xmlns:p="http://schemas.openxmlformats.org/presentationml/2006/main">
   <p:cSld name="Slide 10">
     <p:spTree>
@@ -21059,266 +21445,6 @@
         </p:txBody>
       </p:sp>
     </p:spTree>
-  </p:cSld>
-  <p:clrMapOvr>
-    <a:masterClrMapping/>
-  </p:clrMapOvr>
-</p:sld>
-</file>
-
-<file path=ppt/slides/slide27.xml><?xml version="1.0" encoding="utf-8"?>
-<p:sld xmlns:a="http://schemas.openxmlformats.org/drawingml/2006/main" xmlns:r="http://schemas.openxmlformats.org/officeDocument/2006/relationships" xmlns:p="http://schemas.openxmlformats.org/presentationml/2006/main">
-  <p:cSld>
-    <p:spTree>
-      <p:nvGrpSpPr>
-        <p:cNvPr id="1" name=""/>
-        <p:cNvGrpSpPr/>
-        <p:nvPr/>
-      </p:nvGrpSpPr>
-      <p:grpSpPr>
-        <a:xfrm>
-          <a:off x="0" y="0"/>
-          <a:ext cx="0" cy="0"/>
-          <a:chOff x="0" y="0"/>
-          <a:chExt cx="0" cy="0"/>
-        </a:xfrm>
-      </p:grpSpPr>
-      <p:sp>
-        <p:nvSpPr>
-          <p:cNvPr id="3" name="文本框 2">
-            <a:extLst>
-              <a:ext uri="{FF2B5EF4-FFF2-40B4-BE49-F238E27FC236}">
-                <a16:creationId xmlns:a16="http://schemas.microsoft.com/office/drawing/2014/main" id="{4C0D793D-8B31-9F60-53F9-06932A3D1154}"/>
-              </a:ext>
-            </a:extLst>
-          </p:cNvPr>
-          <p:cNvSpPr txBox="1"/>
-          <p:nvPr/>
-        </p:nvSpPr>
-        <p:spPr>
-          <a:xfrm>
-            <a:off x="385010" y="234548"/>
-            <a:ext cx="4572000" cy="459741"/>
-          </a:xfrm>
-          <a:prstGeom prst="rect">
-            <a:avLst/>
-          </a:prstGeom>
-          <a:noFill/>
-        </p:spPr>
-        <p:txBody>
-          <a:bodyPr wrap="square">
-            <a:spAutoFit/>
-          </a:bodyPr>
-          <a:lstStyle/>
-          <a:p>
-            <a:pPr marL="0" indent="0" algn="l">
-              <a:lnSpc>
-                <a:spcPts val="3150"/>
-              </a:lnSpc>
-              <a:buNone/>
-            </a:pPr>
-            <a:r>
-              <a:rPr lang="zh-CN" altLang="en-US" sz="1800" b="1" dirty="0">
-                <a:solidFill>
-                  <a:srgbClr val="000000"/>
-                </a:solidFill>
-                <a:latin typeface="Microsoft YaHei" pitchFamily="34" charset="0"/>
-                <a:ea typeface="Microsoft YaHei" pitchFamily="34" charset="-122"/>
-                <a:cs typeface="Microsoft YaHei" pitchFamily="34" charset="-120"/>
-              </a:rPr>
-              <a:t>示例一：函数调用出错</a:t>
-            </a:r>
-            <a:endParaRPr lang="en-US" altLang="zh-CN" sz="1800" dirty="0"/>
-          </a:p>
-        </p:txBody>
-      </p:sp>
-      <p:sp>
-        <p:nvSpPr>
-          <p:cNvPr id="5" name="文本框 4">
-            <a:extLst>
-              <a:ext uri="{FF2B5EF4-FFF2-40B4-BE49-F238E27FC236}">
-                <a16:creationId xmlns:a16="http://schemas.microsoft.com/office/drawing/2014/main" id="{BB30656A-65BE-B6DE-28F1-2A0B885D2C83}"/>
-              </a:ext>
-            </a:extLst>
-          </p:cNvPr>
-          <p:cNvSpPr txBox="1"/>
-          <p:nvPr/>
-        </p:nvSpPr>
-        <p:spPr>
-          <a:xfrm>
-            <a:off x="442762" y="789272"/>
-            <a:ext cx="5101390" cy="461665"/>
-          </a:xfrm>
-          <a:prstGeom prst="rect">
-            <a:avLst/>
-          </a:prstGeom>
-          <a:noFill/>
-        </p:spPr>
-        <p:txBody>
-          <a:bodyPr wrap="square" rtlCol="0">
-            <a:spAutoFit/>
-          </a:bodyPr>
-          <a:lstStyle/>
-          <a:p>
-            <a:r>
-              <a:rPr lang="zh-CN" altLang="en-US" sz="1200" dirty="0"/>
-              <a:t>错误：</a:t>
-            </a:r>
-            <a:r>
-              <a:rPr lang="en-US" altLang="zh-CN" sz="1200" dirty="0" err="1"/>
-              <a:t>mul</a:t>
-            </a:r>
-            <a:r>
-              <a:rPr lang="en-US" altLang="zh-CN" sz="1200" dirty="0"/>
-              <a:t> </a:t>
-            </a:r>
-            <a:r>
-              <a:rPr lang="zh-CN" altLang="en-US" sz="1200" dirty="0"/>
-              <a:t>函数需要两个参数，调用时只传了一个参数。</a:t>
-            </a:r>
-            <a:endParaRPr lang="en-US" altLang="zh-CN" sz="1200" dirty="0"/>
-          </a:p>
-          <a:p>
-            <a:endParaRPr lang="en-US" altLang="zh-CN" sz="1200" dirty="0"/>
-          </a:p>
-        </p:txBody>
-      </p:sp>
-      <p:pic>
-        <p:nvPicPr>
-          <p:cNvPr id="9" name="图片 8">
-            <a:extLst>
-              <a:ext uri="{FF2B5EF4-FFF2-40B4-BE49-F238E27FC236}">
-                <a16:creationId xmlns:a16="http://schemas.microsoft.com/office/drawing/2014/main" id="{AF653CE7-94B1-0DD9-274D-14FB6ABC719E}"/>
-              </a:ext>
-            </a:extLst>
-          </p:cNvPr>
-          <p:cNvPicPr>
-            <a:picLocks noChangeAspect="1"/>
-          </p:cNvPicPr>
-          <p:nvPr/>
-        </p:nvPicPr>
-        <p:blipFill>
-          <a:blip r:embed="rId2"/>
-          <a:stretch>
-            <a:fillRect/>
-          </a:stretch>
-        </p:blipFill>
-        <p:spPr>
-          <a:xfrm>
-            <a:off x="481263" y="2091763"/>
-            <a:ext cx="3863852" cy="1985840"/>
-          </a:xfrm>
-          <a:prstGeom prst="rect">
-            <a:avLst/>
-          </a:prstGeom>
-        </p:spPr>
-      </p:pic>
-      <p:pic>
-        <p:nvPicPr>
-          <p:cNvPr id="11" name="图片 10">
-            <a:extLst>
-              <a:ext uri="{FF2B5EF4-FFF2-40B4-BE49-F238E27FC236}">
-                <a16:creationId xmlns:a16="http://schemas.microsoft.com/office/drawing/2014/main" id="{9E974294-4DCF-0799-4A30-FA6DBC3ECAE1}"/>
-              </a:ext>
-            </a:extLst>
-          </p:cNvPr>
-          <p:cNvPicPr>
-            <a:picLocks noChangeAspect="1"/>
-          </p:cNvPicPr>
-          <p:nvPr/>
-        </p:nvPicPr>
-        <p:blipFill>
-          <a:blip r:embed="rId3"/>
-          <a:stretch>
-            <a:fillRect/>
-          </a:stretch>
-        </p:blipFill>
-        <p:spPr>
-          <a:xfrm>
-            <a:off x="4798885" y="1614537"/>
-            <a:ext cx="3863852" cy="2463066"/>
-          </a:xfrm>
-          <a:prstGeom prst="rect">
-            <a:avLst/>
-          </a:prstGeom>
-        </p:spPr>
-      </p:pic>
-      <p:sp>
-        <p:nvSpPr>
-          <p:cNvPr id="12" name="文本框 11">
-            <a:extLst>
-              <a:ext uri="{FF2B5EF4-FFF2-40B4-BE49-F238E27FC236}">
-                <a16:creationId xmlns:a16="http://schemas.microsoft.com/office/drawing/2014/main" id="{67539794-23B9-96A3-9362-B3936AFC8162}"/>
-              </a:ext>
-            </a:extLst>
-          </p:cNvPr>
-          <p:cNvSpPr txBox="1"/>
-          <p:nvPr/>
-        </p:nvSpPr>
-        <p:spPr>
-          <a:xfrm>
-            <a:off x="1775860" y="4268089"/>
-            <a:ext cx="1968367" cy="246221"/>
-          </a:xfrm>
-          <a:prstGeom prst="rect">
-            <a:avLst/>
-          </a:prstGeom>
-          <a:noFill/>
-        </p:spPr>
-        <p:txBody>
-          <a:bodyPr wrap="square" rtlCol="0">
-            <a:spAutoFit/>
-          </a:bodyPr>
-          <a:lstStyle/>
-          <a:p>
-            <a:r>
-              <a:rPr lang="zh-CN" altLang="en-US" sz="1000" dirty="0"/>
-              <a:t>方案一</a:t>
-            </a:r>
-          </a:p>
-        </p:txBody>
-      </p:sp>
-      <p:sp>
-        <p:nvSpPr>
-          <p:cNvPr id="14" name="文本框 13">
-            <a:extLst>
-              <a:ext uri="{FF2B5EF4-FFF2-40B4-BE49-F238E27FC236}">
-                <a16:creationId xmlns:a16="http://schemas.microsoft.com/office/drawing/2014/main" id="{8C986FF1-F322-5741-56A6-B3C517F87F83}"/>
-              </a:ext>
-            </a:extLst>
-          </p:cNvPr>
-          <p:cNvSpPr txBox="1"/>
-          <p:nvPr/>
-        </p:nvSpPr>
-        <p:spPr>
-          <a:xfrm>
-            <a:off x="6407867" y="4268088"/>
-            <a:ext cx="645887" cy="246221"/>
-          </a:xfrm>
-          <a:prstGeom prst="rect">
-            <a:avLst/>
-          </a:prstGeom>
-          <a:noFill/>
-        </p:spPr>
-        <p:txBody>
-          <a:bodyPr wrap="square">
-            <a:spAutoFit/>
-          </a:bodyPr>
-          <a:lstStyle/>
-          <a:p>
-            <a:r>
-              <a:rPr lang="zh-CN" altLang="en-US" sz="1000" dirty="0"/>
-              <a:t>方案二</a:t>
-            </a:r>
-          </a:p>
-        </p:txBody>
-      </p:sp>
-    </p:spTree>
-    <p:extLst>
-      <p:ext uri="{BB962C8B-B14F-4D97-AF65-F5344CB8AC3E}">
-        <p14:creationId xmlns:p14="http://schemas.microsoft.com/office/powerpoint/2010/main" val="1784615763"/>
-      </p:ext>
-    </p:extLst>
   </p:cSld>
   <p:clrMapOvr>
     <a:masterClrMapping/>
@@ -21348,7 +21474,7 @@
           <p:cNvPr id="3" name="文本框 2">
             <a:extLst>
               <a:ext uri="{FF2B5EF4-FFF2-40B4-BE49-F238E27FC236}">
-                <a16:creationId xmlns:a16="http://schemas.microsoft.com/office/drawing/2014/main" id="{90E198A8-7509-1478-BF24-8E9E8D630C42}"/>
+                <a16:creationId xmlns:a16="http://schemas.microsoft.com/office/drawing/2014/main" id="{4C0D793D-8B31-9F60-53F9-06932A3D1154}"/>
               </a:ext>
             </a:extLst>
           </p:cNvPr>
@@ -21357,7 +21483,7 @@
         </p:nvSpPr>
         <p:spPr>
           <a:xfrm>
-            <a:off x="336884" y="268236"/>
+            <a:off x="385010" y="234548"/>
             <a:ext cx="4572000" cy="459741"/>
           </a:xfrm>
           <a:prstGeom prst="rect">
@@ -21386,7 +21512,7 @@
                 <a:ea typeface="Microsoft YaHei" pitchFamily="34" charset="-122"/>
                 <a:cs typeface="Microsoft YaHei" pitchFamily="34" charset="-120"/>
               </a:rPr>
-              <a:t>示例二：函数调用出错</a:t>
+              <a:t>示例一：函数调用出错</a:t>
             </a:r>
             <a:endParaRPr lang="en-US" altLang="zh-CN" sz="1800" dirty="0"/>
           </a:p>
@@ -21394,10 +21520,10 @@
       </p:sp>
       <p:sp>
         <p:nvSpPr>
-          <p:cNvPr id="4" name="文本框 3">
-            <a:extLst>
-              <a:ext uri="{FF2B5EF4-FFF2-40B4-BE49-F238E27FC236}">
-                <a16:creationId xmlns:a16="http://schemas.microsoft.com/office/drawing/2014/main" id="{30F65FF7-759E-28E0-5A87-78AEC4CA1D26}"/>
+          <p:cNvPr id="5" name="文本框 4">
+            <a:extLst>
+              <a:ext uri="{FF2B5EF4-FFF2-40B4-BE49-F238E27FC236}">
+                <a16:creationId xmlns:a16="http://schemas.microsoft.com/office/drawing/2014/main" id="{BB30656A-65BE-B6DE-28F1-2A0B885D2C83}"/>
               </a:ext>
             </a:extLst>
           </p:cNvPr>
@@ -21406,8 +21532,8 @@
         </p:nvSpPr>
         <p:spPr>
           <a:xfrm>
-            <a:off x="418699" y="779646"/>
-            <a:ext cx="5115827" cy="618054"/>
+            <a:off x="442762" y="789272"/>
+            <a:ext cx="5101390" cy="461665"/>
           </a:xfrm>
           <a:prstGeom prst="rect">
             <a:avLst/>
@@ -21420,18 +21546,13 @@
           </a:bodyPr>
           <a:lstStyle/>
           <a:p>
-            <a:pPr>
-              <a:lnSpc>
-                <a:spcPct val="150000"/>
-              </a:lnSpc>
-            </a:pPr>
             <a:r>
               <a:rPr lang="zh-CN" altLang="en-US" sz="1200" dirty="0"/>
-              <a:t>函数实现错误：用户发现 </a:t>
+              <a:t>错误：</a:t>
             </a:r>
             <a:r>
               <a:rPr lang="en-US" altLang="zh-CN" sz="1200" dirty="0" err="1"/>
-              <a:t>qpow</a:t>
+              <a:t>mul</a:t>
             </a:r>
             <a:r>
               <a:rPr lang="en-US" altLang="zh-CN" sz="1200" dirty="0"/>
@@ -21439,41 +21560,21 @@
             </a:r>
             <a:r>
               <a:rPr lang="zh-CN" altLang="en-US" sz="1200" dirty="0"/>
-              <a:t>函数的结果不符合预期，原因是他在 </a:t>
-            </a:r>
-            <a:r>
-              <a:rPr lang="en-US" altLang="zh-CN" sz="1200" dirty="0" err="1"/>
-              <a:t>qpow</a:t>
-            </a:r>
-            <a:r>
-              <a:rPr lang="en-US" altLang="zh-CN" sz="1200" dirty="0"/>
-              <a:t> </a:t>
-            </a:r>
-            <a:r>
-              <a:rPr lang="zh-CN" altLang="en-US" sz="1200" dirty="0"/>
-              <a:t>函数调用的 </a:t>
-            </a:r>
-            <a:r>
-              <a:rPr lang="en-US" altLang="zh-CN" sz="1200" dirty="0" err="1"/>
-              <a:t>is_odd</a:t>
-            </a:r>
-            <a:r>
-              <a:rPr lang="en-US" altLang="zh-CN" sz="1200" dirty="0"/>
-              <a:t> </a:t>
-            </a:r>
-            <a:r>
-              <a:rPr lang="zh-CN" altLang="en-US" sz="1200" dirty="0"/>
-              <a:t>函数实现错误。</a:t>
-            </a:r>
+              <a:t>函数需要两个参数，调用时只传了一个参数。</a:t>
+            </a:r>
+            <a:endParaRPr lang="en-US" altLang="zh-CN" sz="1200" dirty="0"/>
+          </a:p>
+          <a:p>
+            <a:endParaRPr lang="en-US" altLang="zh-CN" sz="1200" dirty="0"/>
           </a:p>
         </p:txBody>
       </p:sp>
       <p:pic>
         <p:nvPicPr>
-          <p:cNvPr id="6" name="图片 5">
-            <a:extLst>
-              <a:ext uri="{FF2B5EF4-FFF2-40B4-BE49-F238E27FC236}">
-                <a16:creationId xmlns:a16="http://schemas.microsoft.com/office/drawing/2014/main" id="{67FFC39A-78D0-93C1-1B95-3B0240EBAE8F}"/>
+          <p:cNvPr id="9" name="图片 8">
+            <a:extLst>
+              <a:ext uri="{FF2B5EF4-FFF2-40B4-BE49-F238E27FC236}">
+                <a16:creationId xmlns:a16="http://schemas.microsoft.com/office/drawing/2014/main" id="{AF653CE7-94B1-0DD9-274D-14FB6ABC719E}"/>
               </a:ext>
             </a:extLst>
           </p:cNvPr>
@@ -21490,8 +21591,8 @@
         </p:blipFill>
         <p:spPr>
           <a:xfrm>
-            <a:off x="5993174" y="858685"/>
-            <a:ext cx="2508603" cy="568835"/>
+            <a:off x="481263" y="2091763"/>
+            <a:ext cx="3863852" cy="1985840"/>
           </a:xfrm>
           <a:prstGeom prst="rect">
             <a:avLst/>
@@ -21500,10 +21601,10 @@
       </p:pic>
       <p:pic>
         <p:nvPicPr>
-          <p:cNvPr id="8" name="图片 7">
-            <a:extLst>
-              <a:ext uri="{FF2B5EF4-FFF2-40B4-BE49-F238E27FC236}">
-                <a16:creationId xmlns:a16="http://schemas.microsoft.com/office/drawing/2014/main" id="{19F3E9A2-8564-C0C9-BDD1-5A5D50268C97}"/>
+          <p:cNvPr id="11" name="图片 10">
+            <a:extLst>
+              <a:ext uri="{FF2B5EF4-FFF2-40B4-BE49-F238E27FC236}">
+                <a16:creationId xmlns:a16="http://schemas.microsoft.com/office/drawing/2014/main" id="{9E974294-4DCF-0799-4A30-FA6DBC3ECAE1}"/>
               </a:ext>
             </a:extLst>
           </p:cNvPr>
@@ -21520,18 +21621,88 @@
         </p:blipFill>
         <p:spPr>
           <a:xfrm>
-            <a:off x="491898" y="1449369"/>
-            <a:ext cx="4031976" cy="3290500"/>
+            <a:off x="4798885" y="1614537"/>
+            <a:ext cx="3863852" cy="2463066"/>
           </a:xfrm>
           <a:prstGeom prst="rect">
             <a:avLst/>
           </a:prstGeom>
         </p:spPr>
       </p:pic>
+      <p:sp>
+        <p:nvSpPr>
+          <p:cNvPr id="12" name="文本框 11">
+            <a:extLst>
+              <a:ext uri="{FF2B5EF4-FFF2-40B4-BE49-F238E27FC236}">
+                <a16:creationId xmlns:a16="http://schemas.microsoft.com/office/drawing/2014/main" id="{67539794-23B9-96A3-9362-B3936AFC8162}"/>
+              </a:ext>
+            </a:extLst>
+          </p:cNvPr>
+          <p:cNvSpPr txBox="1"/>
+          <p:nvPr/>
+        </p:nvSpPr>
+        <p:spPr>
+          <a:xfrm>
+            <a:off x="1775860" y="4268089"/>
+            <a:ext cx="1968367" cy="246221"/>
+          </a:xfrm>
+          <a:prstGeom prst="rect">
+            <a:avLst/>
+          </a:prstGeom>
+          <a:noFill/>
+        </p:spPr>
+        <p:txBody>
+          <a:bodyPr wrap="square" rtlCol="0">
+            <a:spAutoFit/>
+          </a:bodyPr>
+          <a:lstStyle/>
+          <a:p>
+            <a:r>
+              <a:rPr lang="zh-CN" altLang="en-US" sz="1000" dirty="0"/>
+              <a:t>方案一</a:t>
+            </a:r>
+          </a:p>
+        </p:txBody>
+      </p:sp>
+      <p:sp>
+        <p:nvSpPr>
+          <p:cNvPr id="14" name="文本框 13">
+            <a:extLst>
+              <a:ext uri="{FF2B5EF4-FFF2-40B4-BE49-F238E27FC236}">
+                <a16:creationId xmlns:a16="http://schemas.microsoft.com/office/drawing/2014/main" id="{8C986FF1-F322-5741-56A6-B3C517F87F83}"/>
+              </a:ext>
+            </a:extLst>
+          </p:cNvPr>
+          <p:cNvSpPr txBox="1"/>
+          <p:nvPr/>
+        </p:nvSpPr>
+        <p:spPr>
+          <a:xfrm>
+            <a:off x="6407867" y="4268088"/>
+            <a:ext cx="645887" cy="246221"/>
+          </a:xfrm>
+          <a:prstGeom prst="rect">
+            <a:avLst/>
+          </a:prstGeom>
+          <a:noFill/>
+        </p:spPr>
+        <p:txBody>
+          <a:bodyPr wrap="square">
+            <a:spAutoFit/>
+          </a:bodyPr>
+          <a:lstStyle/>
+          <a:p>
+            <a:r>
+              <a:rPr lang="zh-CN" altLang="en-US" sz="1000" dirty="0"/>
+              <a:t>方案二</a:t>
+            </a:r>
+          </a:p>
+        </p:txBody>
+      </p:sp>
     </p:spTree>
     <p:extLst>
       <p:ext uri="{BB962C8B-B14F-4D97-AF65-F5344CB8AC3E}">
-        <p14:creationId xmlns:p14="http://schemas.microsoft.com/office/powerpoint/2010/main" val="731576455"/>
+        <p14:creationId xmlns:p14="http://schemas.microsoft.com/office/powerpoint/2010/main" val="1784615763"/>
       </p:ext>
     </p:extLst>
   </p:cSld>
@@ -21546,13 +21717,7 @@
   <p:cSld>
     <p:spTree>
       <p:nvGrpSpPr>
-        <p:cNvPr id="1" name="">
-          <a:extLst>
-            <a:ext uri="{FF2B5EF4-FFF2-40B4-BE49-F238E27FC236}">
-              <a16:creationId xmlns:a16="http://schemas.microsoft.com/office/drawing/2014/main" id="{776A5CAB-32A3-38E9-7E8B-3A4F337A49A1}"/>
-            </a:ext>
-          </a:extLst>
-        </p:cNvPr>
+        <p:cNvPr id="1" name=""/>
         <p:cNvGrpSpPr/>
         <p:nvPr/>
       </p:nvGrpSpPr>
@@ -21569,7 +21734,7 @@
           <p:cNvPr id="3" name="文本框 2">
             <a:extLst>
               <a:ext uri="{FF2B5EF4-FFF2-40B4-BE49-F238E27FC236}">
-                <a16:creationId xmlns:a16="http://schemas.microsoft.com/office/drawing/2014/main" id="{57C0856C-458E-574D-076C-BB4E40DAB796}"/>
+                <a16:creationId xmlns:a16="http://schemas.microsoft.com/office/drawing/2014/main" id="{90E198A8-7509-1478-BF24-8E9E8D630C42}"/>
               </a:ext>
             </a:extLst>
           </p:cNvPr>
@@ -21607,7 +21772,7 @@
                 <a:ea typeface="Microsoft YaHei" pitchFamily="34" charset="-122"/>
                 <a:cs typeface="Microsoft YaHei" pitchFamily="34" charset="-120"/>
               </a:rPr>
-              <a:t>示例三：函数使用不合理</a:t>
+              <a:t>示例二：函数调用出错</a:t>
             </a:r>
             <a:endParaRPr lang="en-US" altLang="zh-CN" sz="1800" dirty="0"/>
           </a:p>
@@ -21618,7 +21783,7 @@
           <p:cNvPr id="4" name="文本框 3">
             <a:extLst>
               <a:ext uri="{FF2B5EF4-FFF2-40B4-BE49-F238E27FC236}">
-                <a16:creationId xmlns:a16="http://schemas.microsoft.com/office/drawing/2014/main" id="{F7B9FA50-D040-B041-1347-9E871D338293}"/>
+                <a16:creationId xmlns:a16="http://schemas.microsoft.com/office/drawing/2014/main" id="{30F65FF7-759E-28E0-5A87-78AEC4CA1D26}"/>
               </a:ext>
             </a:extLst>
           </p:cNvPr>
@@ -21627,8 +21792,8 @@
         </p:nvSpPr>
         <p:spPr>
           <a:xfrm>
-            <a:off x="418699" y="842210"/>
-            <a:ext cx="5828097" cy="618054"/>
+            <a:off x="418699" y="779646"/>
+            <a:ext cx="5115827" cy="618054"/>
           </a:xfrm>
           <a:prstGeom prst="rect">
             <a:avLst/>
@@ -21672,11 +21837,7 @@
             </a:r>
             <a:r>
               <a:rPr lang="zh-CN" altLang="en-US" sz="1200" dirty="0"/>
-              <a:t>函数使用 </a:t>
-            </a:r>
-            <a:r>
-              <a:rPr lang="en-US" altLang="zh-CN" sz="1200" dirty="0"/>
-              <a:t>odd = !</a:t>
+              <a:t>函数调用的 </a:t>
             </a:r>
             <a:r>
               <a:rPr lang="en-US" altLang="zh-CN" sz="1200" dirty="0" err="1"/>
@@ -21684,42 +21845,21 @@
             </a:r>
             <a:r>
               <a:rPr lang="en-US" altLang="zh-CN" sz="1200" dirty="0"/>
-              <a:t>(b) </a:t>
+              <a:t> </a:t>
             </a:r>
             <a:r>
               <a:rPr lang="zh-CN" altLang="en-US" sz="1200" dirty="0"/>
-              <a:t>来判断 </a:t>
-            </a:r>
-            <a:r>
-              <a:rPr lang="en-US" altLang="zh-CN" sz="1200" dirty="0"/>
-              <a:t>b </a:t>
-            </a:r>
-            <a:r>
-              <a:rPr lang="zh-CN" altLang="en-US" sz="1200" dirty="0"/>
-              <a:t>是否为奇数，实际应该使用 </a:t>
-            </a:r>
-            <a:r>
-              <a:rPr lang="en-US" altLang="zh-CN" sz="1200" dirty="0"/>
-              <a:t>odd = </a:t>
-            </a:r>
-            <a:r>
-              <a:rPr lang="en-US" altLang="zh-CN" sz="1200" dirty="0" err="1"/>
-              <a:t>is_odd</a:t>
-            </a:r>
-            <a:r>
-              <a:rPr lang="en-US" altLang="zh-CN" sz="1200" dirty="0"/>
-              <a:t>(b)</a:t>
-            </a:r>
-            <a:endParaRPr lang="zh-CN" altLang="en-US" sz="1200" dirty="0"/>
+              <a:t>函数实现错误。</a:t>
+            </a:r>
           </a:p>
         </p:txBody>
       </p:sp>
       <p:pic>
         <p:nvPicPr>
-          <p:cNvPr id="5" name="图片 4">
-            <a:extLst>
-              <a:ext uri="{FF2B5EF4-FFF2-40B4-BE49-F238E27FC236}">
-                <a16:creationId xmlns:a16="http://schemas.microsoft.com/office/drawing/2014/main" id="{6CE80BAA-4F4C-13D8-15A2-2E0470133AA4}"/>
+          <p:cNvPr id="6" name="图片 5">
+            <a:extLst>
+              <a:ext uri="{FF2B5EF4-FFF2-40B4-BE49-F238E27FC236}">
+                <a16:creationId xmlns:a16="http://schemas.microsoft.com/office/drawing/2014/main" id="{67FFC39A-78D0-93C1-1B95-3B0240EBAE8F}"/>
               </a:ext>
             </a:extLst>
           </p:cNvPr>
@@ -21736,8 +21876,38 @@
         </p:blipFill>
         <p:spPr>
           <a:xfrm>
-            <a:off x="476451" y="1682822"/>
-            <a:ext cx="4692316" cy="2618468"/>
+            <a:off x="5993174" y="858685"/>
+            <a:ext cx="2508603" cy="568835"/>
+          </a:xfrm>
+          <a:prstGeom prst="rect">
+            <a:avLst/>
+          </a:prstGeom>
+        </p:spPr>
+      </p:pic>
+      <p:pic>
+        <p:nvPicPr>
+          <p:cNvPr id="8" name="图片 7">
+            <a:extLst>
+              <a:ext uri="{FF2B5EF4-FFF2-40B4-BE49-F238E27FC236}">
+                <a16:creationId xmlns:a16="http://schemas.microsoft.com/office/drawing/2014/main" id="{19F3E9A2-8564-C0C9-BDD1-5A5D50268C97}"/>
+              </a:ext>
+            </a:extLst>
+          </p:cNvPr>
+          <p:cNvPicPr>
+            <a:picLocks noChangeAspect="1"/>
+          </p:cNvPicPr>
+          <p:nvPr/>
+        </p:nvPicPr>
+        <p:blipFill>
+          <a:blip r:embed="rId3"/>
+          <a:stretch>
+            <a:fillRect/>
+          </a:stretch>
+        </p:blipFill>
+        <p:spPr>
+          <a:xfrm>
+            <a:off x="491898" y="1449369"/>
+            <a:ext cx="4031976" cy="3290500"/>
           </a:xfrm>
           <a:prstGeom prst="rect">
             <a:avLst/>
@@ -21747,7 +21917,7 @@
     </p:spTree>
     <p:extLst>
       <p:ext uri="{BB962C8B-B14F-4D97-AF65-F5344CB8AC3E}">
-        <p14:creationId xmlns:p14="http://schemas.microsoft.com/office/powerpoint/2010/main" val="3984743991"/>
+        <p14:creationId xmlns:p14="http://schemas.microsoft.com/office/powerpoint/2010/main" val="731576455"/>
       </p:ext>
     </p:extLst>
   </p:cSld>
@@ -21950,6 +22120,222 @@
         <p:cNvPr id="1" name="">
           <a:extLst>
             <a:ext uri="{FF2B5EF4-FFF2-40B4-BE49-F238E27FC236}">
+              <a16:creationId xmlns:a16="http://schemas.microsoft.com/office/drawing/2014/main" id="{776A5CAB-32A3-38E9-7E8B-3A4F337A49A1}"/>
+            </a:ext>
+          </a:extLst>
+        </p:cNvPr>
+        <p:cNvGrpSpPr/>
+        <p:nvPr/>
+      </p:nvGrpSpPr>
+      <p:grpSpPr>
+        <a:xfrm>
+          <a:off x="0" y="0"/>
+          <a:ext cx="0" cy="0"/>
+          <a:chOff x="0" y="0"/>
+          <a:chExt cx="0" cy="0"/>
+        </a:xfrm>
+      </p:grpSpPr>
+      <p:sp>
+        <p:nvSpPr>
+          <p:cNvPr id="3" name="文本框 2">
+            <a:extLst>
+              <a:ext uri="{FF2B5EF4-FFF2-40B4-BE49-F238E27FC236}">
+                <a16:creationId xmlns:a16="http://schemas.microsoft.com/office/drawing/2014/main" id="{57C0856C-458E-574D-076C-BB4E40DAB796}"/>
+              </a:ext>
+            </a:extLst>
+          </p:cNvPr>
+          <p:cNvSpPr txBox="1"/>
+          <p:nvPr/>
+        </p:nvSpPr>
+        <p:spPr>
+          <a:xfrm>
+            <a:off x="336884" y="268236"/>
+            <a:ext cx="4572000" cy="459741"/>
+          </a:xfrm>
+          <a:prstGeom prst="rect">
+            <a:avLst/>
+          </a:prstGeom>
+          <a:noFill/>
+        </p:spPr>
+        <p:txBody>
+          <a:bodyPr wrap="square">
+            <a:spAutoFit/>
+          </a:bodyPr>
+          <a:lstStyle/>
+          <a:p>
+            <a:pPr marL="0" indent="0" algn="l">
+              <a:lnSpc>
+                <a:spcPts val="3150"/>
+              </a:lnSpc>
+              <a:buNone/>
+            </a:pPr>
+            <a:r>
+              <a:rPr lang="zh-CN" altLang="en-US" sz="1800" b="1" dirty="0">
+                <a:solidFill>
+                  <a:srgbClr val="000000"/>
+                </a:solidFill>
+                <a:latin typeface="Microsoft YaHei" pitchFamily="34" charset="0"/>
+                <a:ea typeface="Microsoft YaHei" pitchFamily="34" charset="-122"/>
+                <a:cs typeface="Microsoft YaHei" pitchFamily="34" charset="-120"/>
+              </a:rPr>
+              <a:t>示例三：函数使用不合理</a:t>
+            </a:r>
+            <a:endParaRPr lang="en-US" altLang="zh-CN" sz="1800" dirty="0"/>
+          </a:p>
+        </p:txBody>
+      </p:sp>
+      <p:sp>
+        <p:nvSpPr>
+          <p:cNvPr id="4" name="文本框 3">
+            <a:extLst>
+              <a:ext uri="{FF2B5EF4-FFF2-40B4-BE49-F238E27FC236}">
+                <a16:creationId xmlns:a16="http://schemas.microsoft.com/office/drawing/2014/main" id="{F7B9FA50-D040-B041-1347-9E871D338293}"/>
+              </a:ext>
+            </a:extLst>
+          </p:cNvPr>
+          <p:cNvSpPr txBox="1"/>
+          <p:nvPr/>
+        </p:nvSpPr>
+        <p:spPr>
+          <a:xfrm>
+            <a:off x="418699" y="842210"/>
+            <a:ext cx="5828097" cy="618054"/>
+          </a:xfrm>
+          <a:prstGeom prst="rect">
+            <a:avLst/>
+          </a:prstGeom>
+          <a:noFill/>
+        </p:spPr>
+        <p:txBody>
+          <a:bodyPr wrap="square" rtlCol="0">
+            <a:spAutoFit/>
+          </a:bodyPr>
+          <a:lstStyle/>
+          <a:p>
+            <a:pPr>
+              <a:lnSpc>
+                <a:spcPct val="150000"/>
+              </a:lnSpc>
+            </a:pPr>
+            <a:r>
+              <a:rPr lang="zh-CN" altLang="en-US" sz="1200" dirty="0"/>
+              <a:t>函数实现错误：用户发现 </a:t>
+            </a:r>
+            <a:r>
+              <a:rPr lang="en-US" altLang="zh-CN" sz="1200" dirty="0" err="1"/>
+              <a:t>qpow</a:t>
+            </a:r>
+            <a:r>
+              <a:rPr lang="en-US" altLang="zh-CN" sz="1200" dirty="0"/>
+              <a:t> </a:t>
+            </a:r>
+            <a:r>
+              <a:rPr lang="zh-CN" altLang="en-US" sz="1200" dirty="0"/>
+              <a:t>函数的结果不符合预期，原因是他在 </a:t>
+            </a:r>
+            <a:r>
+              <a:rPr lang="en-US" altLang="zh-CN" sz="1200" dirty="0" err="1"/>
+              <a:t>qpow</a:t>
+            </a:r>
+            <a:r>
+              <a:rPr lang="en-US" altLang="zh-CN" sz="1200" dirty="0"/>
+              <a:t> </a:t>
+            </a:r>
+            <a:r>
+              <a:rPr lang="zh-CN" altLang="en-US" sz="1200" dirty="0"/>
+              <a:t>函数使用 </a:t>
+            </a:r>
+            <a:r>
+              <a:rPr lang="en-US" altLang="zh-CN" sz="1200" dirty="0"/>
+              <a:t>odd = !</a:t>
+            </a:r>
+            <a:r>
+              <a:rPr lang="en-US" altLang="zh-CN" sz="1200" dirty="0" err="1"/>
+              <a:t>is_odd</a:t>
+            </a:r>
+            <a:r>
+              <a:rPr lang="en-US" altLang="zh-CN" sz="1200" dirty="0"/>
+              <a:t>(b) </a:t>
+            </a:r>
+            <a:r>
+              <a:rPr lang="zh-CN" altLang="en-US" sz="1200" dirty="0"/>
+              <a:t>来判断 </a:t>
+            </a:r>
+            <a:r>
+              <a:rPr lang="en-US" altLang="zh-CN" sz="1200" dirty="0"/>
+              <a:t>b </a:t>
+            </a:r>
+            <a:r>
+              <a:rPr lang="zh-CN" altLang="en-US" sz="1200" dirty="0"/>
+              <a:t>是否为奇数，实际应该使用 </a:t>
+            </a:r>
+            <a:r>
+              <a:rPr lang="en-US" altLang="zh-CN" sz="1200" dirty="0"/>
+              <a:t>odd = </a:t>
+            </a:r>
+            <a:r>
+              <a:rPr lang="en-US" altLang="zh-CN" sz="1200" dirty="0" err="1"/>
+              <a:t>is_odd</a:t>
+            </a:r>
+            <a:r>
+              <a:rPr lang="en-US" altLang="zh-CN" sz="1200" dirty="0"/>
+              <a:t>(b)</a:t>
+            </a:r>
+            <a:endParaRPr lang="zh-CN" altLang="en-US" sz="1200" dirty="0"/>
+          </a:p>
+        </p:txBody>
+      </p:sp>
+      <p:pic>
+        <p:nvPicPr>
+          <p:cNvPr id="5" name="图片 4">
+            <a:extLst>
+              <a:ext uri="{FF2B5EF4-FFF2-40B4-BE49-F238E27FC236}">
+                <a16:creationId xmlns:a16="http://schemas.microsoft.com/office/drawing/2014/main" id="{6CE80BAA-4F4C-13D8-15A2-2E0470133AA4}"/>
+              </a:ext>
+            </a:extLst>
+          </p:cNvPr>
+          <p:cNvPicPr>
+            <a:picLocks noChangeAspect="1"/>
+          </p:cNvPicPr>
+          <p:nvPr/>
+        </p:nvPicPr>
+        <p:blipFill>
+          <a:blip r:embed="rId2"/>
+          <a:stretch>
+            <a:fillRect/>
+          </a:stretch>
+        </p:blipFill>
+        <p:spPr>
+          <a:xfrm>
+            <a:off x="476451" y="1682822"/>
+            <a:ext cx="4692316" cy="2618468"/>
+          </a:xfrm>
+          <a:prstGeom prst="rect">
+            <a:avLst/>
+          </a:prstGeom>
+        </p:spPr>
+      </p:pic>
+    </p:spTree>
+    <p:extLst>
+      <p:ext uri="{BB962C8B-B14F-4D97-AF65-F5344CB8AC3E}">
+        <p14:creationId xmlns:p14="http://schemas.microsoft.com/office/powerpoint/2010/main" val="3984743991"/>
+      </p:ext>
+    </p:extLst>
+  </p:cSld>
+  <p:clrMapOvr>
+    <a:masterClrMapping/>
+  </p:clrMapOvr>
+</p:sld>
+</file>
+
+<file path=ppt/slides/slide31.xml><?xml version="1.0" encoding="utf-8"?>
+<p:sld xmlns:a="http://schemas.openxmlformats.org/drawingml/2006/main" xmlns:r="http://schemas.openxmlformats.org/officeDocument/2006/relationships" xmlns:p="http://schemas.openxmlformats.org/presentationml/2006/main">
+  <p:cSld>
+    <p:spTree>
+      <p:nvGrpSpPr>
+        <p:cNvPr id="1" name="">
+          <a:extLst>
+            <a:ext uri="{FF2B5EF4-FFF2-40B4-BE49-F238E27FC236}">
               <a16:creationId xmlns:a16="http://schemas.microsoft.com/office/drawing/2014/main" id="{61804C77-7CBD-9647-9083-B718CED9E304}"/>
             </a:ext>
           </a:extLst>
@@ -22097,7 +22483,7 @@
 </p:sld>
 </file>
 
-<file path=ppt/slides/slide31.xml><?xml version="1.0" encoding="utf-8"?>
+<file path=ppt/slides/slide32.xml><?xml version="1.0" encoding="utf-8"?>
 <p:sld xmlns:a="http://schemas.openxmlformats.org/drawingml/2006/main" xmlns:r="http://schemas.openxmlformats.org/officeDocument/2006/relationships" xmlns:p="http://schemas.openxmlformats.org/presentationml/2006/main">
   <p:cSld>
     <p:spTree>
@@ -22323,7 +22709,7 @@
 </p:sld>
 </file>
 
-<file path=ppt/slides/slide32.xml><?xml version="1.0" encoding="utf-8"?>
+<file path=ppt/slides/slide33.xml><?xml version="1.0" encoding="utf-8"?>
 <p:sld xmlns:a="http://schemas.openxmlformats.org/drawingml/2006/main" xmlns:r="http://schemas.openxmlformats.org/officeDocument/2006/relationships" xmlns:p="http://schemas.openxmlformats.org/presentationml/2006/main">
   <p:cSld>
     <p:spTree>
@@ -22567,7 +22953,7 @@
 </p:sld>
 </file>
 
-<file path=ppt/slides/slide33.xml><?xml version="1.0" encoding="utf-8"?>
+<file path=ppt/slides/slide34.xml><?xml version="1.0" encoding="utf-8"?>
 <p:sld xmlns:a="http://schemas.openxmlformats.org/drawingml/2006/main" xmlns:r="http://schemas.openxmlformats.org/officeDocument/2006/relationships" xmlns:p="http://schemas.openxmlformats.org/presentationml/2006/main">
   <p:cSld name="Slide 15">
     <p:spTree>
@@ -22752,7 +23138,7 @@
 </p:sld>
 </file>
 
-<file path=ppt/slides/slide34.xml><?xml version="1.0" encoding="utf-8"?>
+<file path=ppt/slides/slide35.xml><?xml version="1.0" encoding="utf-8"?>
 <p:sld xmlns:a="http://schemas.openxmlformats.org/drawingml/2006/main" xmlns:r="http://schemas.openxmlformats.org/officeDocument/2006/relationships" xmlns:p="http://schemas.openxmlformats.org/presentationml/2006/main">
   <p:cSld name="Slide 16">
     <p:spTree>
@@ -23652,7 +24038,7 @@
 </p:sld>
 </file>
 
-<file path=ppt/slides/slide35.xml><?xml version="1.0" encoding="utf-8"?>
+<file path=ppt/slides/slide36.xml><?xml version="1.0" encoding="utf-8"?>
 <p:sld xmlns:a="http://schemas.openxmlformats.org/drawingml/2006/main" xmlns:r="http://schemas.openxmlformats.org/officeDocument/2006/relationships" xmlns:p="http://schemas.openxmlformats.org/presentationml/2006/main">
   <p:cSld>
     <p:spTree>
@@ -23858,7 +24244,7 @@
 </p:sld>
 </file>
 
-<file path=ppt/slides/slide36.xml><?xml version="1.0" encoding="utf-8"?>
+<file path=ppt/slides/slide37.xml><?xml version="1.0" encoding="utf-8"?>
 <p:sld xmlns:a="http://schemas.openxmlformats.org/drawingml/2006/main" xmlns:r="http://schemas.openxmlformats.org/officeDocument/2006/relationships" xmlns:p="http://schemas.openxmlformats.org/presentationml/2006/main">
   <p:cSld>
     <p:spTree>
@@ -24062,7 +24448,7 @@
 </p:sld>
 </file>
 
-<file path=ppt/slides/slide37.xml><?xml version="1.0" encoding="utf-8"?>
+<file path=ppt/slides/slide38.xml><?xml version="1.0" encoding="utf-8"?>
 <p:sld xmlns:a="http://schemas.openxmlformats.org/drawingml/2006/main" xmlns:r="http://schemas.openxmlformats.org/officeDocument/2006/relationships" xmlns:p="http://schemas.openxmlformats.org/presentationml/2006/main">
   <p:cSld name="Slide 18">
     <p:spTree>

</xml_diff>